<commit_message>
adding some points to the pptx
</commit_message>
<xml_diff>
--- a/docs/FinalPresentation.pptx
+++ b/docs/FinalPresentation.pptx
@@ -1,6 +1,6 @@
 
 <file path=ppt/presentation.xml><?xml version="1.0" encoding="utf-8"?>
-<p:presentation xmlns:a="http://schemas.openxmlformats.org/drawingml/2006/main" xmlns:r="http://schemas.openxmlformats.org/officeDocument/2006/relationships" xmlns:p="http://schemas.openxmlformats.org/presentationml/2006/main" saveSubsetFonts="1">
+<p:presentation xmlns:a="http://schemas.openxmlformats.org/drawingml/2006/main" xmlns:r="http://schemas.openxmlformats.org/officeDocument/2006/relationships" xmlns:p="http://schemas.openxmlformats.org/presentationml/2006/main" serverZoom="34554" saveSubsetFonts="1">
   <p:sldMasterIdLst>
     <p:sldMasterId id="2147483720" r:id="rId1"/>
   </p:sldMasterIdLst>
@@ -550,7 +550,7 @@
             <a:fld id="{E637BB6B-EE1B-48FB-8575-0D55C373DE88}" type="datetimeFigureOut">
               <a:rPr lang="en-US" smtClean="0"/>
               <a:pPr eaLnBrk="1" latinLnBrk="0" hangingPunct="1"/>
-              <a:t>5/3/2011</a:t>
+              <a:t>5/4/2011</a:t>
             </a:fld>
             <a:endParaRPr lang="en-US"/>
           </a:p>
@@ -1164,7 +1164,7 @@
             <a:fld id="{E637BB6B-EE1B-48FB-8575-0D55C373DE88}" type="datetimeFigureOut">
               <a:rPr lang="en-US" smtClean="0"/>
               <a:pPr eaLnBrk="1" latinLnBrk="0" hangingPunct="1"/>
-              <a:t>5/3/2011</a:t>
+              <a:t>5/4/2011</a:t>
             </a:fld>
             <a:endParaRPr lang="en-US" sz="1000">
               <a:solidFill>
@@ -1758,7 +1758,7 @@
             <a:fld id="{E637BB6B-EE1B-48FB-8575-0D55C373DE88}" type="datetimeFigureOut">
               <a:rPr lang="en-US" smtClean="0"/>
               <a:pPr eaLnBrk="1" latinLnBrk="0" hangingPunct="1"/>
-              <a:t>5/3/2011</a:t>
+              <a:t>5/4/2011</a:t>
             </a:fld>
             <a:endParaRPr lang="en-US"/>
           </a:p>
@@ -2295,7 +2295,7 @@
             <a:fld id="{E637BB6B-EE1B-48FB-8575-0D55C373DE88}" type="datetimeFigureOut">
               <a:rPr lang="en-US" smtClean="0"/>
               <a:pPr eaLnBrk="1" latinLnBrk="0" hangingPunct="1"/>
-              <a:t>5/3/2011</a:t>
+              <a:t>5/4/2011</a:t>
             </a:fld>
             <a:endParaRPr lang="en-US" sz="1000">
               <a:solidFill>
@@ -2719,7 +2719,7 @@
             <a:fld id="{E637BB6B-EE1B-48FB-8575-0D55C373DE88}" type="datetimeFigureOut">
               <a:rPr lang="en-US" smtClean="0"/>
               <a:pPr eaLnBrk="1" latinLnBrk="0" hangingPunct="1"/>
-              <a:t>5/3/2011</a:t>
+              <a:t>5/4/2011</a:t>
             </a:fld>
             <a:endParaRPr lang="en-US" dirty="0"/>
           </a:p>
@@ -3155,7 +3155,7 @@
             <a:fld id="{E637BB6B-EE1B-48FB-8575-0D55C373DE88}" type="datetimeFigureOut">
               <a:rPr lang="en-US" smtClean="0"/>
               <a:pPr eaLnBrk="1" latinLnBrk="0" hangingPunct="1"/>
-              <a:t>5/3/2011</a:t>
+              <a:t>5/4/2011</a:t>
             </a:fld>
             <a:endParaRPr lang="en-US"/>
           </a:p>
@@ -3560,7 +3560,7 @@
             <a:fld id="{E637BB6B-EE1B-48FB-8575-0D55C373DE88}" type="datetimeFigureOut">
               <a:rPr lang="en-US" smtClean="0"/>
               <a:pPr eaLnBrk="1" latinLnBrk="0" hangingPunct="1"/>
-              <a:t>5/3/2011</a:t>
+              <a:t>5/4/2011</a:t>
             </a:fld>
             <a:endParaRPr lang="en-US"/>
           </a:p>
@@ -4037,7 +4037,7 @@
             <a:fld id="{E637BB6B-EE1B-48FB-8575-0D55C373DE88}" type="datetimeFigureOut">
               <a:rPr lang="en-US" smtClean="0"/>
               <a:pPr eaLnBrk="1" latinLnBrk="0" hangingPunct="1"/>
-              <a:t>5/3/2011</a:t>
+              <a:t>5/4/2011</a:t>
             </a:fld>
             <a:endParaRPr lang="en-US" sz="1000">
               <a:solidFill>
@@ -4502,7 +4502,7 @@
             <a:fld id="{E637BB6B-EE1B-48FB-8575-0D55C373DE88}" type="datetimeFigureOut">
               <a:rPr lang="en-US" smtClean="0"/>
               <a:pPr eaLnBrk="1" latinLnBrk="0" hangingPunct="1"/>
-              <a:t>5/3/2011</a:t>
+              <a:t>5/4/2011</a:t>
             </a:fld>
             <a:endParaRPr lang="en-US"/>
           </a:p>
@@ -5025,7 +5025,7 @@
             <a:fld id="{E637BB6B-EE1B-48FB-8575-0D55C373DE88}" type="datetimeFigureOut">
               <a:rPr lang="en-US" smtClean="0"/>
               <a:pPr eaLnBrk="1" latinLnBrk="0" hangingPunct="1"/>
-              <a:t>5/3/2011</a:t>
+              <a:t>5/4/2011</a:t>
             </a:fld>
             <a:endParaRPr lang="en-US"/>
           </a:p>
@@ -5748,7 +5748,7 @@
             <a:fld id="{E637BB6B-EE1B-48FB-8575-0D55C373DE88}" type="datetimeFigureOut">
               <a:rPr lang="en-US" smtClean="0"/>
               <a:pPr eaLnBrk="1" latinLnBrk="0" hangingPunct="1"/>
-              <a:t>5/3/2011</a:t>
+              <a:t>5/4/2011</a:t>
             </a:fld>
             <a:endParaRPr lang="en-US"/>
           </a:p>
@@ -6097,7 +6097,7 @@
             <a:fld id="{E637BB6B-EE1B-48FB-8575-0D55C373DE88}" type="datetimeFigureOut">
               <a:rPr lang="en-US" smtClean="0"/>
               <a:pPr eaLnBrk="1" latinLnBrk="0" hangingPunct="1"/>
-              <a:t>5/3/2011</a:t>
+              <a:t>5/4/2011</a:t>
             </a:fld>
             <a:endParaRPr lang="en-US"/>
           </a:p>
@@ -6369,7 +6369,7 @@
             <a:fld id="{E637BB6B-EE1B-48FB-8575-0D55C373DE88}" type="datetimeFigureOut">
               <a:rPr lang="en-US" smtClean="0"/>
               <a:pPr eaLnBrk="1" latinLnBrk="0" hangingPunct="1"/>
-              <a:t>5/3/2011</a:t>
+              <a:t>5/4/2011</a:t>
             </a:fld>
             <a:endParaRPr lang="en-US"/>
           </a:p>
@@ -6929,7 +6929,7 @@
             <a:fld id="{E637BB6B-EE1B-48FB-8575-0D55C373DE88}" type="datetimeFigureOut">
               <a:rPr lang="en-US" smtClean="0"/>
               <a:pPr eaLnBrk="1" latinLnBrk="0" hangingPunct="1"/>
-              <a:t>5/3/2011</a:t>
+              <a:t>5/4/2011</a:t>
             </a:fld>
             <a:endParaRPr lang="en-US"/>
           </a:p>
@@ -7142,7 +7142,7 @@
             <a:fld id="{E637BB6B-EE1B-48FB-8575-0D55C373DE88}" type="datetimeFigureOut">
               <a:rPr lang="en-US" smtClean="0"/>
               <a:pPr eaLnBrk="1" latinLnBrk="0" hangingPunct="1"/>
-              <a:t>5/3/2011</a:t>
+              <a:t>5/4/2011</a:t>
             </a:fld>
             <a:endParaRPr lang="en-US" sz="1000">
               <a:solidFill>
@@ -7782,21 +7782,13 @@
           <a:p>
             <a:r>
               <a:rPr lang="en-US" dirty="0" smtClean="0"/>
-              <a:t>Server </a:t>
-            </a:r>
+              <a:t>Server acts as a hub, broadcasting to all other clients.</a:t>
+            </a:r>
+          </a:p>
+          <a:p>
             <a:r>
               <a:rPr lang="en-US" dirty="0" smtClean="0"/>
-              <a:t>acts as a hub, broadcasting to all other clients.</a:t>
-            </a:r>
-          </a:p>
-          <a:p>
-            <a:r>
-              <a:rPr lang="en-US" dirty="0" smtClean="0"/>
-              <a:t>Server is lightweight and only maintains information about active drawing sessions and their participants</a:t>
-            </a:r>
-            <a:r>
-              <a:rPr lang="en-US" dirty="0" smtClean="0"/>
-              <a:t>.</a:t>
+              <a:t>Server is lightweight and only maintains information about active drawing sessions and their participants.</a:t>
             </a:r>
           </a:p>
           <a:p>
@@ -7898,7 +7890,6 @@
               <a:rPr lang="en-US" dirty="0" smtClean="0"/>
               <a:t>Setting up RMI tool a little extra time, but the power it provides makes it worthwhile</a:t>
             </a:r>
-            <a:endParaRPr lang="en-US" dirty="0" smtClean="0"/>
           </a:p>
         </p:txBody>
       </p:sp>
@@ -7962,13 +7953,20 @@
         </p:nvSpPr>
         <p:spPr/>
         <p:txBody>
-          <a:bodyPr/>
+          <a:bodyPr>
+            <a:normAutofit fontScale="92500" lnSpcReduction="10000"/>
+          </a:bodyPr>
           <a:lstStyle/>
           <a:p>
             <a:r>
               <a:rPr lang="en-US" dirty="0" smtClean="0"/>
-              <a:t>Getting custom tool classes (plugins) to load across the network</a:t>
-            </a:r>
+              <a:t>Getting custom tool classes (plugins) to load across the </a:t>
+            </a:r>
+            <a:r>
+              <a:rPr lang="en-US" dirty="0" smtClean="0"/>
+              <a:t>network when the client is not expected to server it</a:t>
+            </a:r>
+            <a:endParaRPr lang="en-US" dirty="0" smtClean="0"/>
           </a:p>
           <a:p>
             <a:r>
@@ -7985,7 +7983,17 @@
           <a:p>
             <a:r>
               <a:rPr lang="en-US" dirty="0" smtClean="0"/>
-              <a:t>How to keep a reference to the server on the client and vice versa</a:t>
+              <a:t>How to keep a reference to the server on the client and vice </a:t>
+            </a:r>
+            <a:r>
+              <a:rPr lang="en-US" dirty="0" smtClean="0"/>
+              <a:t>versa</a:t>
+            </a:r>
+          </a:p>
+          <a:p>
+            <a:r>
+              <a:rPr lang="en-US" dirty="0" smtClean="0"/>
+              <a:t>Implementing client callbacks when the client is behind a firewall</a:t>
             </a:r>
             <a:endParaRPr lang="en-US" dirty="0"/>
           </a:p>
@@ -8058,7 +8066,6 @@
               <a:rPr lang="en-US" dirty="0" smtClean="0"/>
               <a:t>RMI may introduce unnecessary complexity for simpler projects</a:t>
             </a:r>
-            <a:endParaRPr lang="en-US" dirty="0" smtClean="0"/>
           </a:p>
         </p:txBody>
       </p:sp>

</xml_diff>